<commit_message>
Swap upper and lower bounds of error bars for beta_fixed (exp.1)
</commit_message>
<xml_diff>
--- a/vignettes/Figures/manually_created_plots/manually_created_figures .pptx
+++ b/vignettes/Figures/manually_created_plots/manually_created_figures .pptx
@@ -201,7 +201,7 @@
           <a:p>
             <a:fld id="{3D79C78D-BEE0-3E48-B401-2B1A9A747922}" type="datetimeFigureOut">
               <a:rPr lang="en-US" smtClean="0"/>
-              <a:t>8/31/22</a:t>
+              <a:t>10/5/22</a:t>
             </a:fld>
             <a:endParaRPr lang="en-US"/>
           </a:p>
@@ -782,7 +782,7 @@
           <a:p>
             <a:fld id="{020234D1-918D-A04F-ADE0-AF041D21BD3B}" type="datetimeFigureOut">
               <a:rPr lang="en-US" smtClean="0"/>
-              <a:t>8/31/22</a:t>
+              <a:t>10/5/22</a:t>
             </a:fld>
             <a:endParaRPr lang="en-US"/>
           </a:p>
@@ -952,7 +952,7 @@
           <a:p>
             <a:fld id="{020234D1-918D-A04F-ADE0-AF041D21BD3B}" type="datetimeFigureOut">
               <a:rPr lang="en-US" smtClean="0"/>
-              <a:t>8/31/22</a:t>
+              <a:t>10/5/22</a:t>
             </a:fld>
             <a:endParaRPr lang="en-US"/>
           </a:p>
@@ -1132,7 +1132,7 @@
           <a:p>
             <a:fld id="{020234D1-918D-A04F-ADE0-AF041D21BD3B}" type="datetimeFigureOut">
               <a:rPr lang="en-US" smtClean="0"/>
-              <a:t>8/31/22</a:t>
+              <a:t>10/5/22</a:t>
             </a:fld>
             <a:endParaRPr lang="en-US"/>
           </a:p>
@@ -1302,7 +1302,7 @@
           <a:p>
             <a:fld id="{020234D1-918D-A04F-ADE0-AF041D21BD3B}" type="datetimeFigureOut">
               <a:rPr lang="en-US" smtClean="0"/>
-              <a:t>8/31/22</a:t>
+              <a:t>10/5/22</a:t>
             </a:fld>
             <a:endParaRPr lang="en-US"/>
           </a:p>
@@ -1548,7 +1548,7 @@
           <a:p>
             <a:fld id="{020234D1-918D-A04F-ADE0-AF041D21BD3B}" type="datetimeFigureOut">
               <a:rPr lang="en-US" smtClean="0"/>
-              <a:t>8/31/22</a:t>
+              <a:t>10/5/22</a:t>
             </a:fld>
             <a:endParaRPr lang="en-US"/>
           </a:p>
@@ -1780,7 +1780,7 @@
           <a:p>
             <a:fld id="{020234D1-918D-A04F-ADE0-AF041D21BD3B}" type="datetimeFigureOut">
               <a:rPr lang="en-US" smtClean="0"/>
-              <a:t>8/31/22</a:t>
+              <a:t>10/5/22</a:t>
             </a:fld>
             <a:endParaRPr lang="en-US"/>
           </a:p>
@@ -2147,7 +2147,7 @@
           <a:p>
             <a:fld id="{020234D1-918D-A04F-ADE0-AF041D21BD3B}" type="datetimeFigureOut">
               <a:rPr lang="en-US" smtClean="0"/>
-              <a:t>8/31/22</a:t>
+              <a:t>10/5/22</a:t>
             </a:fld>
             <a:endParaRPr lang="en-US"/>
           </a:p>
@@ -2265,7 +2265,7 @@
           <a:p>
             <a:fld id="{020234D1-918D-A04F-ADE0-AF041D21BD3B}" type="datetimeFigureOut">
               <a:rPr lang="en-US" smtClean="0"/>
-              <a:t>8/31/22</a:t>
+              <a:t>10/5/22</a:t>
             </a:fld>
             <a:endParaRPr lang="en-US"/>
           </a:p>
@@ -2360,7 +2360,7 @@
           <a:p>
             <a:fld id="{020234D1-918D-A04F-ADE0-AF041D21BD3B}" type="datetimeFigureOut">
               <a:rPr lang="en-US" smtClean="0"/>
-              <a:t>8/31/22</a:t>
+              <a:t>10/5/22</a:t>
             </a:fld>
             <a:endParaRPr lang="en-US"/>
           </a:p>
@@ -2637,7 +2637,7 @@
           <a:p>
             <a:fld id="{020234D1-918D-A04F-ADE0-AF041D21BD3B}" type="datetimeFigureOut">
               <a:rPr lang="en-US" smtClean="0"/>
-              <a:t>8/31/22</a:t>
+              <a:t>10/5/22</a:t>
             </a:fld>
             <a:endParaRPr lang="en-US"/>
           </a:p>
@@ -2894,7 +2894,7 @@
           <a:p>
             <a:fld id="{020234D1-918D-A04F-ADE0-AF041D21BD3B}" type="datetimeFigureOut">
               <a:rPr lang="en-US" smtClean="0"/>
-              <a:t>8/31/22</a:t>
+              <a:t>10/5/22</a:t>
             </a:fld>
             <a:endParaRPr lang="en-US"/>
           </a:p>
@@ -3107,7 +3107,7 @@
           <a:p>
             <a:fld id="{020234D1-918D-A04F-ADE0-AF041D21BD3B}" type="datetimeFigureOut">
               <a:rPr lang="en-US" smtClean="0"/>
-              <a:t>8/31/22</a:t>
+              <a:t>10/5/22</a:t>
             </a:fld>
             <a:endParaRPr lang="en-US"/>
           </a:p>
@@ -4899,7 +4899,9 @@
           <a:prstGeom prst="rect">
             <a:avLst/>
           </a:prstGeom>
-          <a:noFill/>
+          <a:solidFill>
+            <a:schemeClr val="bg1"/>
+          </a:solidFill>
         </p:spPr>
         <p:txBody>
           <a:bodyPr wrap="none" rtlCol="0">
@@ -5159,8 +5161,8 @@
         </p:nvCxnSpPr>
         <p:spPr>
           <a:xfrm flipV="1">
-            <a:off x="3333473" y="5237730"/>
-            <a:ext cx="11729748" cy="129869"/>
+            <a:off x="3333473" y="5301987"/>
+            <a:ext cx="11727233" cy="65612"/>
           </a:xfrm>
           <a:prstGeom prst="line">
             <a:avLst/>
@@ -5470,6 +5472,426 @@
               </a:rPr>
               <a:t>.</a:t>
             </a:r>
+          </a:p>
+        </p:txBody>
+      </p:sp>
+      <p:sp>
+        <p:nvSpPr>
+          <p:cNvPr id="3" name="Rectangle 2">
+            <a:extLst>
+              <a:ext uri="{FF2B5EF4-FFF2-40B4-BE49-F238E27FC236}">
+                <a16:creationId xmlns:a16="http://schemas.microsoft.com/office/drawing/2014/main" id="{863F6540-74F4-A6CA-DF4A-1C0FFFE675E5}"/>
+              </a:ext>
+            </a:extLst>
+          </p:cNvPr>
+          <p:cNvSpPr/>
+          <p:nvPr/>
+        </p:nvSpPr>
+        <p:spPr>
+          <a:xfrm>
+            <a:off x="2079098" y="7994295"/>
+            <a:ext cx="72000" cy="72000"/>
+          </a:xfrm>
+          <a:prstGeom prst="rect">
+            <a:avLst/>
+          </a:prstGeom>
+        </p:spPr>
+        <p:style>
+          <a:lnRef idx="2">
+            <a:schemeClr val="dk1">
+              <a:shade val="50000"/>
+            </a:schemeClr>
+          </a:lnRef>
+          <a:fillRef idx="1">
+            <a:schemeClr val="dk1"/>
+          </a:fillRef>
+          <a:effectRef idx="0">
+            <a:schemeClr val="dk1"/>
+          </a:effectRef>
+          <a:fontRef idx="minor">
+            <a:schemeClr val="lt1"/>
+          </a:fontRef>
+        </p:style>
+        <p:txBody>
+          <a:bodyPr rtlCol="0" anchor="ctr"/>
+          <a:lstStyle/>
+          <a:p>
+            <a:pPr algn="ctr"/>
+            <a:endParaRPr lang="en-US">
+              <a:ln>
+                <a:solidFill>
+                  <a:sysClr val="windowText" lastClr="000000"/>
+                </a:solidFill>
+              </a:ln>
+            </a:endParaRPr>
+          </a:p>
+        </p:txBody>
+      </p:sp>
+      <p:sp>
+        <p:nvSpPr>
+          <p:cNvPr id="5" name="Rectangle 4">
+            <a:extLst>
+              <a:ext uri="{FF2B5EF4-FFF2-40B4-BE49-F238E27FC236}">
+                <a16:creationId xmlns:a16="http://schemas.microsoft.com/office/drawing/2014/main" id="{0C74245A-BF4F-6E61-95A1-2202A450D036}"/>
+              </a:ext>
+            </a:extLst>
+          </p:cNvPr>
+          <p:cNvSpPr/>
+          <p:nvPr/>
+        </p:nvSpPr>
+        <p:spPr>
+          <a:xfrm>
+            <a:off x="2215494" y="2342573"/>
+            <a:ext cx="72000" cy="72000"/>
+          </a:xfrm>
+          <a:prstGeom prst="rect">
+            <a:avLst/>
+          </a:prstGeom>
+        </p:spPr>
+        <p:style>
+          <a:lnRef idx="2">
+            <a:schemeClr val="dk1">
+              <a:shade val="50000"/>
+            </a:schemeClr>
+          </a:lnRef>
+          <a:fillRef idx="1">
+            <a:schemeClr val="dk1"/>
+          </a:fillRef>
+          <a:effectRef idx="0">
+            <a:schemeClr val="dk1"/>
+          </a:effectRef>
+          <a:fontRef idx="minor">
+            <a:schemeClr val="lt1"/>
+          </a:fontRef>
+        </p:style>
+        <p:txBody>
+          <a:bodyPr rtlCol="0" anchor="ctr"/>
+          <a:lstStyle/>
+          <a:p>
+            <a:pPr algn="ctr"/>
+            <a:endParaRPr lang="en-US">
+              <a:ln>
+                <a:solidFill>
+                  <a:sysClr val="windowText" lastClr="000000"/>
+                </a:solidFill>
+              </a:ln>
+            </a:endParaRPr>
+          </a:p>
+        </p:txBody>
+      </p:sp>
+      <p:sp>
+        <p:nvSpPr>
+          <p:cNvPr id="6" name="Oval 5">
+            <a:extLst>
+              <a:ext uri="{FF2B5EF4-FFF2-40B4-BE49-F238E27FC236}">
+                <a16:creationId xmlns:a16="http://schemas.microsoft.com/office/drawing/2014/main" id="{A2F96703-8392-076C-D35C-E20520A706EF}"/>
+              </a:ext>
+            </a:extLst>
+          </p:cNvPr>
+          <p:cNvSpPr/>
+          <p:nvPr/>
+        </p:nvSpPr>
+        <p:spPr>
+          <a:xfrm>
+            <a:off x="5443945" y="8067654"/>
+            <a:ext cx="72000" cy="72000"/>
+          </a:xfrm>
+          <a:prstGeom prst="ellipse">
+            <a:avLst/>
+          </a:prstGeom>
+          <a:solidFill>
+            <a:schemeClr val="tx1"/>
+          </a:solidFill>
+          <a:ln>
+            <a:solidFill>
+              <a:schemeClr val="tx1"/>
+            </a:solidFill>
+          </a:ln>
+        </p:spPr>
+        <p:style>
+          <a:lnRef idx="2">
+            <a:schemeClr val="accent1">
+              <a:shade val="50000"/>
+            </a:schemeClr>
+          </a:lnRef>
+          <a:fillRef idx="1">
+            <a:schemeClr val="accent1"/>
+          </a:fillRef>
+          <a:effectRef idx="0">
+            <a:schemeClr val="accent1"/>
+          </a:effectRef>
+          <a:fontRef idx="minor">
+            <a:schemeClr val="lt1"/>
+          </a:fontRef>
+        </p:style>
+        <p:txBody>
+          <a:bodyPr rtlCol="0" anchor="ctr"/>
+          <a:lstStyle/>
+          <a:p>
+            <a:pPr algn="ctr"/>
+            <a:endParaRPr lang="en-US" dirty="0"/>
+          </a:p>
+        </p:txBody>
+      </p:sp>
+      <p:sp>
+        <p:nvSpPr>
+          <p:cNvPr id="10" name="Oval 9">
+            <a:extLst>
+              <a:ext uri="{FF2B5EF4-FFF2-40B4-BE49-F238E27FC236}">
+                <a16:creationId xmlns:a16="http://schemas.microsoft.com/office/drawing/2014/main" id="{917E3D63-E748-D65E-B80A-7723E71A8E41}"/>
+              </a:ext>
+            </a:extLst>
+          </p:cNvPr>
+          <p:cNvSpPr/>
+          <p:nvPr/>
+        </p:nvSpPr>
+        <p:spPr>
+          <a:xfrm>
+            <a:off x="5392469" y="2376971"/>
+            <a:ext cx="72000" cy="72000"/>
+          </a:xfrm>
+          <a:prstGeom prst="ellipse">
+            <a:avLst/>
+          </a:prstGeom>
+          <a:solidFill>
+            <a:schemeClr val="tx1"/>
+          </a:solidFill>
+          <a:ln>
+            <a:solidFill>
+              <a:schemeClr val="tx1"/>
+            </a:solidFill>
+          </a:ln>
+        </p:spPr>
+        <p:style>
+          <a:lnRef idx="2">
+            <a:schemeClr val="accent1">
+              <a:shade val="50000"/>
+            </a:schemeClr>
+          </a:lnRef>
+          <a:fillRef idx="1">
+            <a:schemeClr val="accent1"/>
+          </a:fillRef>
+          <a:effectRef idx="0">
+            <a:schemeClr val="accent1"/>
+          </a:effectRef>
+          <a:fontRef idx="minor">
+            <a:schemeClr val="lt1"/>
+          </a:fontRef>
+        </p:style>
+        <p:txBody>
+          <a:bodyPr rtlCol="0" anchor="ctr"/>
+          <a:lstStyle/>
+          <a:p>
+            <a:pPr algn="ctr"/>
+            <a:endParaRPr lang="en-US" dirty="0"/>
+          </a:p>
+        </p:txBody>
+      </p:sp>
+      <p:sp>
+        <p:nvSpPr>
+          <p:cNvPr id="16" name="Triangle 15">
+            <a:extLst>
+              <a:ext uri="{FF2B5EF4-FFF2-40B4-BE49-F238E27FC236}">
+                <a16:creationId xmlns:a16="http://schemas.microsoft.com/office/drawing/2014/main" id="{214B092A-5A07-8612-EC80-ADB7D684FA4A}"/>
+              </a:ext>
+            </a:extLst>
+          </p:cNvPr>
+          <p:cNvSpPr/>
+          <p:nvPr/>
+        </p:nvSpPr>
+        <p:spPr>
+          <a:xfrm rot="16200000">
+            <a:off x="8609214" y="8021790"/>
+            <a:ext cx="72000" cy="72000"/>
+          </a:xfrm>
+          <a:prstGeom prst="triangle">
+            <a:avLst/>
+          </a:prstGeom>
+          <a:solidFill>
+            <a:schemeClr val="tx1"/>
+          </a:solidFill>
+          <a:ln>
+            <a:solidFill>
+              <a:schemeClr val="tx1"/>
+            </a:solidFill>
+          </a:ln>
+        </p:spPr>
+        <p:style>
+          <a:lnRef idx="2">
+            <a:schemeClr val="accent1">
+              <a:shade val="50000"/>
+            </a:schemeClr>
+          </a:lnRef>
+          <a:fillRef idx="1">
+            <a:schemeClr val="accent1"/>
+          </a:fillRef>
+          <a:effectRef idx="0">
+            <a:schemeClr val="accent1"/>
+          </a:effectRef>
+          <a:fontRef idx="minor">
+            <a:schemeClr val="lt1"/>
+          </a:fontRef>
+        </p:style>
+        <p:txBody>
+          <a:bodyPr rtlCol="0" anchor="ctr"/>
+          <a:lstStyle/>
+          <a:p>
+            <a:pPr algn="ctr"/>
+            <a:endParaRPr lang="en-US"/>
+          </a:p>
+        </p:txBody>
+      </p:sp>
+      <p:sp>
+        <p:nvSpPr>
+          <p:cNvPr id="18" name="Triangle 17">
+            <a:extLst>
+              <a:ext uri="{FF2B5EF4-FFF2-40B4-BE49-F238E27FC236}">
+                <a16:creationId xmlns:a16="http://schemas.microsoft.com/office/drawing/2014/main" id="{A4D2AFB3-F98C-F2BF-90A8-160130FD27EF}"/>
+              </a:ext>
+            </a:extLst>
+          </p:cNvPr>
+          <p:cNvSpPr/>
+          <p:nvPr/>
+        </p:nvSpPr>
+        <p:spPr>
+          <a:xfrm rot="16200000">
+            <a:off x="8400687" y="2376971"/>
+            <a:ext cx="72000" cy="72000"/>
+          </a:xfrm>
+          <a:prstGeom prst="triangle">
+            <a:avLst/>
+          </a:prstGeom>
+          <a:solidFill>
+            <a:schemeClr val="tx1"/>
+          </a:solidFill>
+          <a:ln>
+            <a:solidFill>
+              <a:schemeClr val="tx1"/>
+            </a:solidFill>
+          </a:ln>
+        </p:spPr>
+        <p:style>
+          <a:lnRef idx="2">
+            <a:schemeClr val="accent1">
+              <a:shade val="50000"/>
+            </a:schemeClr>
+          </a:lnRef>
+          <a:fillRef idx="1">
+            <a:schemeClr val="accent1"/>
+          </a:fillRef>
+          <a:effectRef idx="0">
+            <a:schemeClr val="accent1"/>
+          </a:effectRef>
+          <a:fontRef idx="minor">
+            <a:schemeClr val="lt1"/>
+          </a:fontRef>
+        </p:style>
+        <p:txBody>
+          <a:bodyPr rtlCol="0" anchor="ctr"/>
+          <a:lstStyle/>
+          <a:p>
+            <a:pPr algn="ctr"/>
+            <a:endParaRPr lang="en-US"/>
+          </a:p>
+        </p:txBody>
+      </p:sp>
+      <p:sp>
+        <p:nvSpPr>
+          <p:cNvPr id="23" name="Diamond 22">
+            <a:extLst>
+              <a:ext uri="{FF2B5EF4-FFF2-40B4-BE49-F238E27FC236}">
+                <a16:creationId xmlns:a16="http://schemas.microsoft.com/office/drawing/2014/main" id="{37CD2919-0081-80CA-0CA9-B3A5865ECA5C}"/>
+              </a:ext>
+            </a:extLst>
+          </p:cNvPr>
+          <p:cNvSpPr/>
+          <p:nvPr/>
+        </p:nvSpPr>
+        <p:spPr>
+          <a:xfrm>
+            <a:off x="11941100" y="8030295"/>
+            <a:ext cx="84752" cy="90311"/>
+          </a:xfrm>
+          <a:prstGeom prst="diamond">
+            <a:avLst/>
+          </a:prstGeom>
+        </p:spPr>
+        <p:style>
+          <a:lnRef idx="2">
+            <a:schemeClr val="dk1">
+              <a:shade val="50000"/>
+            </a:schemeClr>
+          </a:lnRef>
+          <a:fillRef idx="1">
+            <a:schemeClr val="dk1"/>
+          </a:fillRef>
+          <a:effectRef idx="0">
+            <a:schemeClr val="dk1"/>
+          </a:effectRef>
+          <a:fontRef idx="minor">
+            <a:schemeClr val="lt1"/>
+          </a:fontRef>
+        </p:style>
+        <p:txBody>
+          <a:bodyPr rtlCol="0" anchor="ctr"/>
+          <a:lstStyle/>
+          <a:p>
+            <a:pPr algn="ctr"/>
+            <a:endParaRPr lang="en-US">
+              <a:solidFill>
+                <a:sysClr val="windowText" lastClr="000000"/>
+              </a:solidFill>
+            </a:endParaRPr>
+          </a:p>
+        </p:txBody>
+      </p:sp>
+      <p:sp>
+        <p:nvSpPr>
+          <p:cNvPr id="24" name="Diamond 23">
+            <a:extLst>
+              <a:ext uri="{FF2B5EF4-FFF2-40B4-BE49-F238E27FC236}">
+                <a16:creationId xmlns:a16="http://schemas.microsoft.com/office/drawing/2014/main" id="{CE5DAD88-0C55-6E27-5C98-85C71655C43A}"/>
+              </a:ext>
+            </a:extLst>
+          </p:cNvPr>
+          <p:cNvSpPr/>
+          <p:nvPr/>
+        </p:nvSpPr>
+        <p:spPr>
+          <a:xfrm>
+            <a:off x="11898724" y="2331815"/>
+            <a:ext cx="84752" cy="90311"/>
+          </a:xfrm>
+          <a:prstGeom prst="diamond">
+            <a:avLst/>
+          </a:prstGeom>
+        </p:spPr>
+        <p:style>
+          <a:lnRef idx="2">
+            <a:schemeClr val="dk1">
+              <a:shade val="50000"/>
+            </a:schemeClr>
+          </a:lnRef>
+          <a:fillRef idx="1">
+            <a:schemeClr val="dk1"/>
+          </a:fillRef>
+          <a:effectRef idx="0">
+            <a:schemeClr val="dk1"/>
+          </a:effectRef>
+          <a:fontRef idx="minor">
+            <a:schemeClr val="lt1"/>
+          </a:fontRef>
+        </p:style>
+        <p:txBody>
+          <a:bodyPr rtlCol="0" anchor="ctr"/>
+          <a:lstStyle/>
+          <a:p>
+            <a:pPr algn="ctr"/>
+            <a:endParaRPr lang="en-US">
+              <a:solidFill>
+                <a:sysClr val="windowText" lastClr="000000"/>
+              </a:solidFill>
+            </a:endParaRPr>
           </a:p>
         </p:txBody>
       </p:sp>
@@ -5739,10 +6161,10 @@
       </p:grpSpPr>
       <p:pic>
         <p:nvPicPr>
-          <p:cNvPr id="4" name="Picture 3">
+          <p:cNvPr id="5" name="Picture 4" descr="Chart, box and whisker chart&#10;&#10;Description automatically generated">
             <a:extLst>
               <a:ext uri="{FF2B5EF4-FFF2-40B4-BE49-F238E27FC236}">
-                <a16:creationId xmlns:a16="http://schemas.microsoft.com/office/drawing/2014/main" id="{23CCE925-1160-2B45-EFEB-61DF5FBBA3EC}"/>
+                <a16:creationId xmlns:a16="http://schemas.microsoft.com/office/drawing/2014/main" id="{9AF136D1-DD6E-F941-BA7F-3D0A475DF632}"/>
               </a:ext>
             </a:extLst>
           </p:cNvPr>
@@ -5751,16 +6173,15 @@
           </p:cNvPicPr>
           <p:nvPr/>
         </p:nvPicPr>
-        <p:blipFill>
+        <p:blipFill rotWithShape="1">
           <a:blip r:embed="rId2"/>
-          <a:stretch>
-            <a:fillRect/>
-          </a:stretch>
+          <a:srcRect r="764"/>
+          <a:stretch/>
         </p:blipFill>
         <p:spPr>
           <a:xfrm>
-            <a:off x="6955342" y="1679936"/>
-            <a:ext cx="7730476" cy="6328122"/>
+            <a:off x="7204151" y="2259106"/>
+            <a:ext cx="6658927" cy="5297534"/>
           </a:xfrm>
           <a:prstGeom prst="rect">
             <a:avLst/>
@@ -5769,10 +6190,10 @@
       </p:pic>
       <p:pic>
         <p:nvPicPr>
-          <p:cNvPr id="2" name="Picture 1">
+          <p:cNvPr id="7" name="Picture 6" descr="Text&#10;&#10;Description automatically generated with medium confidence">
             <a:extLst>
               <a:ext uri="{FF2B5EF4-FFF2-40B4-BE49-F238E27FC236}">
-                <a16:creationId xmlns:a16="http://schemas.microsoft.com/office/drawing/2014/main" id="{F3F366E4-38E7-5CD0-1774-BE8323FF26AC}"/>
+                <a16:creationId xmlns:a16="http://schemas.microsoft.com/office/drawing/2014/main" id="{BDD42FD7-58EB-7FFF-2FAA-55BBE7E2E824}"/>
               </a:ext>
             </a:extLst>
           </p:cNvPr>
@@ -5789,8 +6210,8 @@
         </p:blipFill>
         <p:spPr>
           <a:xfrm>
-            <a:off x="6955342" y="8014927"/>
-            <a:ext cx="8128000" cy="2184400"/>
+            <a:off x="7421250" y="7556640"/>
+            <a:ext cx="6658927" cy="1766654"/>
           </a:xfrm>
           <a:prstGeom prst="rect">
             <a:avLst/>

</xml_diff>